<commit_message>
updated notebooks and added slides
</commit_message>
<xml_diff>
--- a/ethereum_slides.pptx
+++ b/ethereum_slides.pptx
@@ -18,8 +18,8 @@
     <p:sldId id="267" r:id="rId12"/>
     <p:sldId id="272" r:id="rId13"/>
     <p:sldId id="264" r:id="rId14"/>
-    <p:sldId id="270" r:id="rId15"/>
-    <p:sldId id="268" r:id="rId16"/>
+    <p:sldId id="268" r:id="rId15"/>
+    <p:sldId id="270" r:id="rId16"/>
     <p:sldId id="271" r:id="rId17"/>
   </p:sldIdLst>
   <p:sldSz cx="9144000" cy="6858000" type="screen4x3"/>
@@ -1064,19 +1064,11 @@
           <a:p>
             <a:r>
               <a:rPr lang="en-US" dirty="0" smtClean="0"/>
-              <a:t>- take out </a:t>
-            </a:r>
-            <a:r>
-              <a:rPr lang="en-US" dirty="0" err="1" smtClean="0"/>
-              <a:t>equestion</a:t>
-            </a:r>
-            <a:r>
-              <a:rPr lang="en-US" dirty="0" smtClean="0"/>
-              <a:t> or define </a:t>
-            </a:r>
-            <a:r>
-              <a:rPr lang="en-US" dirty="0" err="1" smtClean="0"/>
-              <a:t>everythin</a:t>
+              <a:t>- mu is a summary statistic of distribution</a:t>
+            </a:r>
+            <a:r>
+              <a:rPr lang="en-US" baseline="0" dirty="0" smtClean="0"/>
+              <a:t> of miner values</a:t>
             </a:r>
             <a:endParaRPr lang="en-US" dirty="0"/>
           </a:p>
@@ -1266,6 +1258,120 @@
     <p:extLst>
       <p:ext uri="{BB962C8B-B14F-4D97-AF65-F5344CB8AC3E}">
         <p14:creationId xmlns:p14="http://schemas.microsoft.com/office/powerpoint/2010/main" val="2570070736"/>
+      </p:ext>
+    </p:extLst>
+  </p:cSld>
+  <p:clrMapOvr>
+    <a:masterClrMapping/>
+  </p:clrMapOvr>
+</p:notes>
+</file>
+
+<file path=ppt/notesSlides/notesSlide6.xml><?xml version="1.0" encoding="utf-8"?>
+<p:notes xmlns:a="http://schemas.openxmlformats.org/drawingml/2006/main" xmlns:r="http://schemas.openxmlformats.org/officeDocument/2006/relationships" xmlns:p="http://schemas.openxmlformats.org/presentationml/2006/main">
+  <p:cSld>
+    <p:spTree>
+      <p:nvGrpSpPr>
+        <p:cNvPr id="1" name=""/>
+        <p:cNvGrpSpPr/>
+        <p:nvPr/>
+      </p:nvGrpSpPr>
+      <p:grpSpPr>
+        <a:xfrm>
+          <a:off x="0" y="0"/>
+          <a:ext cx="0" cy="0"/>
+          <a:chOff x="0" y="0"/>
+          <a:chExt cx="0" cy="0"/>
+        </a:xfrm>
+      </p:grpSpPr>
+      <p:sp>
+        <p:nvSpPr>
+          <p:cNvPr id="2" name="Slide Image Placeholder 1"/>
+          <p:cNvSpPr>
+            <a:spLocks noGrp="1" noRot="1" noChangeAspect="1"/>
+          </p:cNvSpPr>
+          <p:nvPr>
+            <p:ph type="sldImg"/>
+          </p:nvPr>
+        </p:nvSpPr>
+        <p:spPr/>
+      </p:sp>
+      <p:sp>
+        <p:nvSpPr>
+          <p:cNvPr id="3" name="Notes Placeholder 2"/>
+          <p:cNvSpPr>
+            <a:spLocks noGrp="1"/>
+          </p:cNvSpPr>
+          <p:nvPr>
+            <p:ph type="body" idx="1"/>
+          </p:nvPr>
+        </p:nvSpPr>
+        <p:spPr/>
+        <p:txBody>
+          <a:bodyPr/>
+          <a:lstStyle/>
+          <a:p>
+            <a:pPr marL="171450" indent="-171450">
+              <a:buFontTx/>
+              <a:buChar char="-"/>
+            </a:pPr>
+            <a:r>
+              <a:rPr lang="en-US" dirty="0" smtClean="0"/>
+              <a:t>we noticed</a:t>
+            </a:r>
+            <a:r>
+              <a:rPr lang="en-US" baseline="0" dirty="0" smtClean="0"/>
+              <a:t> that the most important features were our hindsight features based on the history of blocks compared to the transaction-specific features which were of minimal importance</a:t>
+            </a:r>
+          </a:p>
+          <a:p>
+            <a:pPr marL="171450" indent="-171450">
+              <a:buFontTx/>
+              <a:buChar char="-"/>
+            </a:pPr>
+            <a:r>
+              <a:rPr lang="en-US" baseline="0" dirty="0" smtClean="0"/>
+              <a:t>this indicates that when making predictions using </a:t>
+            </a:r>
+            <a:r>
+              <a:rPr lang="en-US" baseline="0" dirty="0" err="1" smtClean="0"/>
+              <a:t>blockchainn</a:t>
+            </a:r>
+            <a:r>
+              <a:rPr lang="en-US" baseline="0" dirty="0" smtClean="0"/>
+              <a:t> data, looking at transactions alone is not sufficient, block data must also be considered in addition to transaction data</a:t>
+            </a:r>
+            <a:endParaRPr lang="en-US" dirty="0"/>
+          </a:p>
+        </p:txBody>
+      </p:sp>
+      <p:sp>
+        <p:nvSpPr>
+          <p:cNvPr id="4" name="Slide Number Placeholder 3"/>
+          <p:cNvSpPr>
+            <a:spLocks noGrp="1"/>
+          </p:cNvSpPr>
+          <p:nvPr>
+            <p:ph type="sldNum" sz="quarter" idx="10"/>
+          </p:nvPr>
+        </p:nvSpPr>
+        <p:spPr/>
+        <p:txBody>
+          <a:bodyPr/>
+          <a:lstStyle/>
+          <a:p>
+            <a:fld id="{F8902179-D047-444F-9006-57F40D209AEE}" type="slidenum">
+              <a:rPr lang="en-US" smtClean="0"/>
+              <a:t>10</a:t>
+            </a:fld>
+            <a:endParaRPr lang="en-US"/>
+          </a:p>
+        </p:txBody>
+      </p:sp>
+    </p:spTree>
+    <p:extLst>
+      <p:ext uri="{BB962C8B-B14F-4D97-AF65-F5344CB8AC3E}">
+        <p14:creationId xmlns:p14="http://schemas.microsoft.com/office/powerpoint/2010/main" val="4105582874"/>
       </p:ext>
     </p:extLst>
   </p:cSld>
@@ -4430,14 +4536,14 @@
       </p:grpSpPr>
       <p:pic>
         <p:nvPicPr>
-          <p:cNvPr id="3" name="Picture 2" descr="feat_import_pruned.png"/>
+          <p:cNvPr id="2" name="Picture 1" descr="feat_import_pruned.png"/>
           <p:cNvPicPr>
             <a:picLocks noChangeAspect="1"/>
           </p:cNvPicPr>
           <p:nvPr/>
         </p:nvPicPr>
         <p:blipFill>
-          <a:blip r:embed="rId2">
+          <a:blip r:embed="rId3">
             <a:extLst>
               <a:ext uri="{28A0092B-C50C-407E-A947-70E740481C1C}">
                 <a14:useLocalDpi xmlns:a14="http://schemas.microsoft.com/office/drawing/2010/main" val="0"/>
@@ -4450,8 +4556,8 @@
         </p:blipFill>
         <p:spPr>
           <a:xfrm>
-            <a:off x="1534657" y="535060"/>
-            <a:ext cx="5785835" cy="5785835"/>
+            <a:off x="1646669" y="617441"/>
+            <a:ext cx="5486400" cy="5486400"/>
           </a:xfrm>
           <a:prstGeom prst="rect">
             <a:avLst/>
@@ -4479,6 +4585,202 @@
 </file>
 
 <file path=ppt/slides/slide11.xml><?xml version="1.0" encoding="utf-8"?>
+<p:sld xmlns:a="http://schemas.openxmlformats.org/drawingml/2006/main" xmlns:r="http://schemas.openxmlformats.org/officeDocument/2006/relationships" xmlns:p="http://schemas.openxmlformats.org/presentationml/2006/main">
+  <p:cSld>
+    <p:spTree>
+      <p:nvGrpSpPr>
+        <p:cNvPr id="1" name=""/>
+        <p:cNvGrpSpPr/>
+        <p:nvPr/>
+      </p:nvGrpSpPr>
+      <p:grpSpPr>
+        <a:xfrm>
+          <a:off x="0" y="0"/>
+          <a:ext cx="0" cy="0"/>
+          <a:chOff x="0" y="0"/>
+          <a:chExt cx="0" cy="0"/>
+        </a:xfrm>
+      </p:grpSpPr>
+      <p:sp>
+        <p:nvSpPr>
+          <p:cNvPr id="2" name="TextBox 1"/>
+          <p:cNvSpPr txBox="1"/>
+          <p:nvPr/>
+        </p:nvSpPr>
+        <p:spPr>
+          <a:xfrm>
+            <a:off x="769084" y="1425510"/>
+            <a:ext cx="7962587" cy="3293209"/>
+          </a:xfrm>
+          <a:prstGeom prst="rect">
+            <a:avLst/>
+          </a:prstGeom>
+          <a:noFill/>
+        </p:spPr>
+        <p:txBody>
+          <a:bodyPr wrap="square" rtlCol="0">
+            <a:spAutoFit/>
+          </a:bodyPr>
+          <a:lstStyle/>
+          <a:p>
+            <a:r>
+              <a:rPr lang="en-US" sz="3600" b="1" dirty="0" smtClean="0">
+                <a:latin typeface="Arial"/>
+                <a:cs typeface="Arial"/>
+              </a:rPr>
+              <a:t>Future</a:t>
+            </a:r>
+          </a:p>
+          <a:p>
+            <a:endParaRPr lang="en-US" sz="2800" b="1" dirty="0">
+              <a:latin typeface="Arial"/>
+              <a:cs typeface="Arial"/>
+            </a:endParaRPr>
+          </a:p>
+          <a:p>
+            <a:r>
+              <a:rPr lang="en-US" sz="2400" dirty="0" smtClean="0">
+                <a:solidFill>
+                  <a:schemeClr val="tx1">
+                    <a:lumMod val="75000"/>
+                    <a:lumOff val="25000"/>
+                  </a:schemeClr>
+                </a:solidFill>
+                <a:latin typeface="Arial"/>
+                <a:cs typeface="Arial"/>
+              </a:rPr>
+              <a:t>– Utilize entire </a:t>
+            </a:r>
+            <a:r>
+              <a:rPr lang="en-US" sz="2400" dirty="0" err="1" smtClean="0">
+                <a:solidFill>
+                  <a:schemeClr val="tx1">
+                    <a:lumMod val="75000"/>
+                    <a:lumOff val="25000"/>
+                  </a:schemeClr>
+                </a:solidFill>
+                <a:latin typeface="Arial"/>
+                <a:cs typeface="Arial"/>
+              </a:rPr>
+              <a:t>ethereum</a:t>
+            </a:r>
+            <a:r>
+              <a:rPr lang="en-US" sz="2400" dirty="0" smtClean="0">
+                <a:solidFill>
+                  <a:schemeClr val="tx1">
+                    <a:lumMod val="75000"/>
+                    <a:lumOff val="25000"/>
+                  </a:schemeClr>
+                </a:solidFill>
+                <a:latin typeface="Arial"/>
+                <a:cs typeface="Arial"/>
+              </a:rPr>
+              <a:t> </a:t>
+            </a:r>
+            <a:r>
+              <a:rPr lang="en-US" sz="2400" dirty="0" err="1" smtClean="0">
+                <a:solidFill>
+                  <a:schemeClr val="tx1">
+                    <a:lumMod val="75000"/>
+                    <a:lumOff val="25000"/>
+                  </a:schemeClr>
+                </a:solidFill>
+                <a:latin typeface="Arial"/>
+                <a:cs typeface="Arial"/>
+              </a:rPr>
+              <a:t>blockchain</a:t>
+            </a:r>
+            <a:r>
+              <a:rPr lang="en-US" sz="2400" dirty="0" smtClean="0">
+                <a:solidFill>
+                  <a:schemeClr val="tx1">
+                    <a:lumMod val="75000"/>
+                    <a:lumOff val="25000"/>
+                  </a:schemeClr>
+                </a:solidFill>
+                <a:latin typeface="Arial"/>
+                <a:cs typeface="Arial"/>
+              </a:rPr>
+              <a:t> data while also taking in real-time data as it comes in</a:t>
+            </a:r>
+          </a:p>
+          <a:p>
+            <a:endParaRPr lang="en-US" sz="2400" dirty="0">
+              <a:solidFill>
+                <a:schemeClr val="tx1">
+                  <a:lumMod val="75000"/>
+                  <a:lumOff val="25000"/>
+                </a:schemeClr>
+              </a:solidFill>
+              <a:latin typeface="Arial"/>
+              <a:cs typeface="Arial"/>
+            </a:endParaRPr>
+          </a:p>
+          <a:p>
+            <a:r>
+              <a:rPr lang="en-US" sz="2400" dirty="0" smtClean="0">
+                <a:solidFill>
+                  <a:schemeClr val="tx1">
+                    <a:lumMod val="75000"/>
+                    <a:lumOff val="25000"/>
+                  </a:schemeClr>
+                </a:solidFill>
+                <a:latin typeface="Arial"/>
+                <a:cs typeface="Arial"/>
+              </a:rPr>
+              <a:t>– Employ neural network model</a:t>
+            </a:r>
+          </a:p>
+          <a:p>
+            <a:endParaRPr lang="en-US" sz="2400" dirty="0">
+              <a:solidFill>
+                <a:schemeClr val="tx1">
+                  <a:lumMod val="75000"/>
+                  <a:lumOff val="25000"/>
+                </a:schemeClr>
+              </a:solidFill>
+              <a:latin typeface="Arial"/>
+              <a:cs typeface="Arial"/>
+            </a:endParaRPr>
+          </a:p>
+          <a:p>
+            <a:r>
+              <a:rPr lang="en-US" sz="2400" dirty="0" smtClean="0">
+                <a:solidFill>
+                  <a:schemeClr val="tx1">
+                    <a:lumMod val="75000"/>
+                    <a:lumOff val="25000"/>
+                  </a:schemeClr>
+                </a:solidFill>
+                <a:latin typeface="Arial"/>
+                <a:cs typeface="Arial"/>
+              </a:rPr>
+              <a:t>– Provide real-time gas recommendations </a:t>
+            </a:r>
+          </a:p>
+        </p:txBody>
+      </p:sp>
+    </p:spTree>
+    <p:extLst>
+      <p:ext uri="{BB962C8B-B14F-4D97-AF65-F5344CB8AC3E}">
+        <p14:creationId xmlns:p14="http://schemas.microsoft.com/office/powerpoint/2010/main" val="265894674"/>
+      </p:ext>
+    </p:extLst>
+  </p:cSld>
+  <p:clrMapOvr>
+    <a:masterClrMapping/>
+  </p:clrMapOvr>
+  <p:timing>
+    <p:tnLst>
+      <p:par>
+        <p:cTn xmlns:p14="http://schemas.microsoft.com/office/powerpoint/2010/main" id="1" dur="indefinite" restart="never" nodeType="tmRoot"/>
+      </p:par>
+    </p:tnLst>
+  </p:timing>
+</p:sld>
+</file>
+
+<file path=ppt/slides/slide12.xml><?xml version="1.0" encoding="utf-8"?>
 <p:sld xmlns:a="http://schemas.openxmlformats.org/drawingml/2006/main" xmlns:r="http://schemas.openxmlformats.org/officeDocument/2006/relationships" xmlns:p="http://schemas.openxmlformats.org/presentationml/2006/main">
   <p:cSld>
     <p:spTree>
@@ -4695,202 +4997,6 @@
 </p:sld>
 </file>
 
-<file path=ppt/slides/slide12.xml><?xml version="1.0" encoding="utf-8"?>
-<p:sld xmlns:a="http://schemas.openxmlformats.org/drawingml/2006/main" xmlns:r="http://schemas.openxmlformats.org/officeDocument/2006/relationships" xmlns:p="http://schemas.openxmlformats.org/presentationml/2006/main">
-  <p:cSld>
-    <p:spTree>
-      <p:nvGrpSpPr>
-        <p:cNvPr id="1" name=""/>
-        <p:cNvGrpSpPr/>
-        <p:nvPr/>
-      </p:nvGrpSpPr>
-      <p:grpSpPr>
-        <a:xfrm>
-          <a:off x="0" y="0"/>
-          <a:ext cx="0" cy="0"/>
-          <a:chOff x="0" y="0"/>
-          <a:chExt cx="0" cy="0"/>
-        </a:xfrm>
-      </p:grpSpPr>
-      <p:sp>
-        <p:nvSpPr>
-          <p:cNvPr id="2" name="TextBox 1"/>
-          <p:cNvSpPr txBox="1"/>
-          <p:nvPr/>
-        </p:nvSpPr>
-        <p:spPr>
-          <a:xfrm>
-            <a:off x="769084" y="1425510"/>
-            <a:ext cx="7962587" cy="3293209"/>
-          </a:xfrm>
-          <a:prstGeom prst="rect">
-            <a:avLst/>
-          </a:prstGeom>
-          <a:noFill/>
-        </p:spPr>
-        <p:txBody>
-          <a:bodyPr wrap="square" rtlCol="0">
-            <a:spAutoFit/>
-          </a:bodyPr>
-          <a:lstStyle/>
-          <a:p>
-            <a:r>
-              <a:rPr lang="en-US" sz="3600" b="1" dirty="0" smtClean="0">
-                <a:latin typeface="Arial"/>
-                <a:cs typeface="Arial"/>
-              </a:rPr>
-              <a:t>Future</a:t>
-            </a:r>
-          </a:p>
-          <a:p>
-            <a:endParaRPr lang="en-US" sz="2800" b="1" dirty="0">
-              <a:latin typeface="Arial"/>
-              <a:cs typeface="Arial"/>
-            </a:endParaRPr>
-          </a:p>
-          <a:p>
-            <a:r>
-              <a:rPr lang="en-US" sz="2400" dirty="0" smtClean="0">
-                <a:solidFill>
-                  <a:schemeClr val="tx1">
-                    <a:lumMod val="75000"/>
-                    <a:lumOff val="25000"/>
-                  </a:schemeClr>
-                </a:solidFill>
-                <a:latin typeface="Arial"/>
-                <a:cs typeface="Arial"/>
-              </a:rPr>
-              <a:t>– Utilize entire </a:t>
-            </a:r>
-            <a:r>
-              <a:rPr lang="en-US" sz="2400" dirty="0" err="1" smtClean="0">
-                <a:solidFill>
-                  <a:schemeClr val="tx1">
-                    <a:lumMod val="75000"/>
-                    <a:lumOff val="25000"/>
-                  </a:schemeClr>
-                </a:solidFill>
-                <a:latin typeface="Arial"/>
-                <a:cs typeface="Arial"/>
-              </a:rPr>
-              <a:t>ethereum</a:t>
-            </a:r>
-            <a:r>
-              <a:rPr lang="en-US" sz="2400" dirty="0" smtClean="0">
-                <a:solidFill>
-                  <a:schemeClr val="tx1">
-                    <a:lumMod val="75000"/>
-                    <a:lumOff val="25000"/>
-                  </a:schemeClr>
-                </a:solidFill>
-                <a:latin typeface="Arial"/>
-                <a:cs typeface="Arial"/>
-              </a:rPr>
-              <a:t> </a:t>
-            </a:r>
-            <a:r>
-              <a:rPr lang="en-US" sz="2400" dirty="0" err="1" smtClean="0">
-                <a:solidFill>
-                  <a:schemeClr val="tx1">
-                    <a:lumMod val="75000"/>
-                    <a:lumOff val="25000"/>
-                  </a:schemeClr>
-                </a:solidFill>
-                <a:latin typeface="Arial"/>
-                <a:cs typeface="Arial"/>
-              </a:rPr>
-              <a:t>blockchain</a:t>
-            </a:r>
-            <a:r>
-              <a:rPr lang="en-US" sz="2400" dirty="0" smtClean="0">
-                <a:solidFill>
-                  <a:schemeClr val="tx1">
-                    <a:lumMod val="75000"/>
-                    <a:lumOff val="25000"/>
-                  </a:schemeClr>
-                </a:solidFill>
-                <a:latin typeface="Arial"/>
-                <a:cs typeface="Arial"/>
-              </a:rPr>
-              <a:t> data while also taking in real-time data as it comes in</a:t>
-            </a:r>
-          </a:p>
-          <a:p>
-            <a:endParaRPr lang="en-US" sz="2400" dirty="0">
-              <a:solidFill>
-                <a:schemeClr val="tx1">
-                  <a:lumMod val="75000"/>
-                  <a:lumOff val="25000"/>
-                </a:schemeClr>
-              </a:solidFill>
-              <a:latin typeface="Arial"/>
-              <a:cs typeface="Arial"/>
-            </a:endParaRPr>
-          </a:p>
-          <a:p>
-            <a:r>
-              <a:rPr lang="en-US" sz="2400" dirty="0" smtClean="0">
-                <a:solidFill>
-                  <a:schemeClr val="tx1">
-                    <a:lumMod val="75000"/>
-                    <a:lumOff val="25000"/>
-                  </a:schemeClr>
-                </a:solidFill>
-                <a:latin typeface="Arial"/>
-                <a:cs typeface="Arial"/>
-              </a:rPr>
-              <a:t>– Employ neural network model</a:t>
-            </a:r>
-          </a:p>
-          <a:p>
-            <a:endParaRPr lang="en-US" sz="2400" dirty="0">
-              <a:solidFill>
-                <a:schemeClr val="tx1">
-                  <a:lumMod val="75000"/>
-                  <a:lumOff val="25000"/>
-                </a:schemeClr>
-              </a:solidFill>
-              <a:latin typeface="Arial"/>
-              <a:cs typeface="Arial"/>
-            </a:endParaRPr>
-          </a:p>
-          <a:p>
-            <a:r>
-              <a:rPr lang="en-US" sz="2400" dirty="0" smtClean="0">
-                <a:solidFill>
-                  <a:schemeClr val="tx1">
-                    <a:lumMod val="75000"/>
-                    <a:lumOff val="25000"/>
-                  </a:schemeClr>
-                </a:solidFill>
-                <a:latin typeface="Arial"/>
-                <a:cs typeface="Arial"/>
-              </a:rPr>
-              <a:t>– Provide real-time gas recommendations </a:t>
-            </a:r>
-          </a:p>
-        </p:txBody>
-      </p:sp>
-    </p:spTree>
-    <p:extLst>
-      <p:ext uri="{BB962C8B-B14F-4D97-AF65-F5344CB8AC3E}">
-        <p14:creationId xmlns:p14="http://schemas.microsoft.com/office/powerpoint/2010/main" val="265894674"/>
-      </p:ext>
-    </p:extLst>
-  </p:cSld>
-  <p:clrMapOvr>
-    <a:masterClrMapping/>
-  </p:clrMapOvr>
-  <p:timing>
-    <p:tnLst>
-      <p:par>
-        <p:cTn xmlns:p14="http://schemas.microsoft.com/office/powerpoint/2010/main" id="1" dur="indefinite" restart="never" nodeType="tmRoot"/>
-      </p:par>
-    </p:tnLst>
-  </p:timing>
-</p:sld>
-</file>
-
 <file path=ppt/slides/slide13.xml><?xml version="1.0" encoding="utf-8"?>
 <p:sld xmlns:a="http://schemas.openxmlformats.org/drawingml/2006/main" xmlns:r="http://schemas.openxmlformats.org/officeDocument/2006/relationships" xmlns:p="http://schemas.openxmlformats.org/presentationml/2006/main">
   <p:cSld>
@@ -4918,7 +5024,133 @@
         </p:nvSpPr>
         <p:spPr>
           <a:xfrm>
-            <a:off x="685800" y="2130429"/>
+            <a:off x="838200" y="3752854"/>
+            <a:ext cx="7772400" cy="1470025"/>
+          </a:xfrm>
+          <a:prstGeom prst="rect">
+            <a:avLst/>
+          </a:prstGeom>
+        </p:spPr>
+        <p:txBody>
+          <a:bodyPr>
+            <a:noAutofit/>
+          </a:bodyPr>
+          <a:lstStyle>
+            <a:lvl1pPr algn="ctr" defTabSz="457200" rtl="0" eaLnBrk="1" latinLnBrk="0" hangingPunct="1">
+              <a:spcBef>
+                <a:spcPct val="0"/>
+              </a:spcBef>
+              <a:buNone/>
+              <a:defRPr sz="4400" kern="1200">
+                <a:solidFill>
+                  <a:schemeClr val="tx1"/>
+                </a:solidFill>
+                <a:latin typeface="+mj-lt"/>
+                <a:ea typeface="+mj-ea"/>
+                <a:cs typeface="+mj-cs"/>
+              </a:defRPr>
+            </a:lvl1pPr>
+          </a:lstStyle>
+          <a:p>
+            <a:r>
+              <a:rPr lang="en-US" sz="2400" b="1" dirty="0" smtClean="0">
+                <a:latin typeface="Arial"/>
+                <a:cs typeface="Arial"/>
+              </a:rPr>
+              <a:t>Acknowledgements</a:t>
+            </a:r>
+          </a:p>
+          <a:p>
+            <a:r>
+              <a:rPr lang="en-US" sz="2400" dirty="0" err="1" smtClean="0">
+                <a:solidFill>
+                  <a:srgbClr val="404040"/>
+                </a:solidFill>
+                <a:latin typeface="Arial"/>
+                <a:cs typeface="Arial"/>
+              </a:rPr>
+              <a:t>Sweetbridge</a:t>
+            </a:r>
+            <a:endParaRPr lang="en-US" sz="2400" dirty="0" smtClean="0">
+              <a:solidFill>
+                <a:srgbClr val="404040"/>
+              </a:solidFill>
+              <a:latin typeface="Arial"/>
+              <a:cs typeface="Arial"/>
+            </a:endParaRPr>
+          </a:p>
+          <a:p>
+            <a:pPr marL="342900" indent="-342900">
+              <a:buFont typeface="Arial"/>
+              <a:buChar char="•"/>
+            </a:pPr>
+            <a:r>
+              <a:rPr lang="en-US" sz="2400" dirty="0" err="1" smtClean="0">
+                <a:solidFill>
+                  <a:srgbClr val="404040"/>
+                </a:solidFill>
+                <a:latin typeface="Arial"/>
+                <a:cs typeface="Arial"/>
+              </a:rPr>
+              <a:t>Hui</a:t>
+            </a:r>
+            <a:r>
+              <a:rPr lang="en-US" sz="2400" dirty="0" smtClean="0">
+                <a:solidFill>
+                  <a:srgbClr val="404040"/>
+                </a:solidFill>
+                <a:latin typeface="Arial"/>
+                <a:cs typeface="Arial"/>
+              </a:rPr>
+              <a:t> Huang</a:t>
+            </a:r>
+          </a:p>
+          <a:p>
+            <a:pPr marL="342900" indent="-342900">
+              <a:buFont typeface="Arial"/>
+              <a:buChar char="•"/>
+            </a:pPr>
+            <a:r>
+              <a:rPr lang="en-US" sz="2400" dirty="0" smtClean="0">
+                <a:solidFill>
+                  <a:srgbClr val="404040"/>
+                </a:solidFill>
+                <a:latin typeface="Arial"/>
+                <a:cs typeface="Arial"/>
+              </a:rPr>
+              <a:t>Michael </a:t>
+            </a:r>
+            <a:r>
+              <a:rPr lang="en-US" sz="2400" dirty="0" err="1" smtClean="0">
+                <a:solidFill>
+                  <a:srgbClr val="404040"/>
+                </a:solidFill>
+                <a:latin typeface="Arial"/>
+                <a:cs typeface="Arial"/>
+              </a:rPr>
+              <a:t>Zargham</a:t>
+            </a:r>
+            <a:endParaRPr lang="en-US" sz="2400" dirty="0">
+              <a:solidFill>
+                <a:srgbClr val="404040"/>
+              </a:solidFill>
+              <a:latin typeface="Arial"/>
+              <a:cs typeface="Arial"/>
+            </a:endParaRPr>
+          </a:p>
+        </p:txBody>
+      </p:sp>
+      <p:sp>
+        <p:nvSpPr>
+          <p:cNvPr id="3" name="Title 1"/>
+          <p:cNvSpPr txBox="1">
+            <a:spLocks/>
+          </p:cNvSpPr>
+          <p:nvPr/>
+        </p:nvSpPr>
+        <p:spPr>
+          <a:xfrm>
+            <a:off x="838200" y="2282829"/>
             <a:ext cx="7772400" cy="1470025"/>
           </a:xfrm>
           <a:prstGeom prst="rect">
@@ -5019,8 +5251,8 @@
         </p:blipFill>
         <p:spPr>
           <a:xfrm>
-            <a:off x="1323532" y="489202"/>
-            <a:ext cx="5777043" cy="1451171"/>
+            <a:off x="776149" y="1723158"/>
+            <a:ext cx="4595731" cy="1154430"/>
           </a:xfrm>
           <a:prstGeom prst="rect">
             <a:avLst/>
@@ -5049,14 +5281,63 @@
         </p:blipFill>
         <p:spPr>
           <a:xfrm>
-            <a:off x="1323532" y="2438342"/>
-            <a:ext cx="6314352" cy="3578133"/>
+            <a:off x="2240246" y="3002859"/>
+            <a:ext cx="5397637" cy="3058661"/>
           </a:xfrm>
           <a:prstGeom prst="rect">
             <a:avLst/>
           </a:prstGeom>
         </p:spPr>
       </p:pic>
+      <p:sp>
+        <p:nvSpPr>
+          <p:cNvPr id="4" name="TextBox 3"/>
+          <p:cNvSpPr txBox="1"/>
+          <p:nvPr/>
+        </p:nvSpPr>
+        <p:spPr>
+          <a:xfrm>
+            <a:off x="776149" y="684581"/>
+            <a:ext cx="4778547" cy="646331"/>
+          </a:xfrm>
+          <a:prstGeom prst="rect">
+            <a:avLst/>
+          </a:prstGeom>
+          <a:noFill/>
+        </p:spPr>
+        <p:txBody>
+          <a:bodyPr wrap="none" rtlCol="0">
+            <a:spAutoFit/>
+          </a:bodyPr>
+          <a:lstStyle/>
+          <a:p>
+            <a:r>
+              <a:rPr lang="en-US" sz="3600" dirty="0" err="1" smtClean="0">
+                <a:latin typeface="Arial"/>
+                <a:cs typeface="Arial"/>
+              </a:rPr>
+              <a:t>Blockchain</a:t>
+            </a:r>
+            <a:r>
+              <a:rPr lang="en-US" sz="3600" dirty="0" smtClean="0">
+                <a:latin typeface="Arial"/>
+                <a:cs typeface="Arial"/>
+              </a:rPr>
+              <a:t> technology</a:t>
+            </a:r>
+            <a:endParaRPr lang="en-US" sz="2400" dirty="0" smtClean="0">
+              <a:solidFill>
+                <a:schemeClr val="tx1">
+                  <a:lumMod val="75000"/>
+                  <a:lumOff val="25000"/>
+                </a:schemeClr>
+              </a:solidFill>
+              <a:latin typeface="Arial"/>
+              <a:cs typeface="Arial"/>
+            </a:endParaRPr>
+          </a:p>
+        </p:txBody>
+      </p:sp>
     </p:spTree>
     <p:extLst>
       <p:ext uri="{BB962C8B-B14F-4D97-AF65-F5344CB8AC3E}">
@@ -6555,33 +6836,15 @@
                                   </p:childTnLst>
                                 </p:cTn>
                               </p:par>
-                            </p:childTnLst>
-                          </p:cTn>
-                        </p:par>
-                      </p:childTnLst>
-                    </p:cTn>
-                  </p:par>
-                  <p:par>
-                    <p:cTn id="7" fill="hold">
-                      <p:stCondLst>
-                        <p:cond delay="indefinite"/>
-                      </p:stCondLst>
-                      <p:childTnLst>
-                        <p:par>
-                          <p:cTn id="8" fill="hold">
-                            <p:stCondLst>
-                              <p:cond delay="0"/>
-                            </p:stCondLst>
-                            <p:childTnLst>
                               <p:par>
-                                <p:cTn id="9" presetID="1" presetClass="entr" presetSubtype="0" fill="hold" grpId="0" nodeType="clickEffect">
+                                <p:cTn id="7" presetID="1" presetClass="entr" presetSubtype="0" fill="hold" grpId="0" nodeType="withEffect">
                                   <p:stCondLst>
                                     <p:cond delay="0"/>
                                   </p:stCondLst>
                                   <p:childTnLst>
                                     <p:set>
                                       <p:cBhvr>
-                                        <p:cTn id="10" dur="1" fill="hold">
+                                        <p:cTn id="8" dur="1" fill="hold">
                                           <p:stCondLst>
                                             <p:cond delay="0"/>
                                           </p:stCondLst>
@@ -6965,7 +7228,7 @@
           <a:graphicData uri="http://schemas.openxmlformats.org/presentationml/2006/ole">
             <mc:AlternateContent xmlns:mc="http://schemas.openxmlformats.org/markup-compatibility/2006">
               <mc:Choice xmlns:v="urn:schemas-microsoft-com:vml" Requires="v">
-                <p:oleObj spid="_x0000_s1094" name="Equation" r:id="rId5" imgW="114300" imgH="165100" progId="Equation.3">
+                <p:oleObj spid="_x0000_s1102" name="Equation" r:id="rId5" imgW="114300" imgH="165100" progId="Equation.3">
                   <p:embed/>
                 </p:oleObj>
               </mc:Choice>
@@ -8085,108 +8348,9 @@
   <p:timing>
     <p:tnLst>
       <p:par>
-        <p:cTn xmlns:p14="http://schemas.microsoft.com/office/powerpoint/2010/main" id="1" dur="indefinite" restart="never" nodeType="tmRoot">
-          <p:childTnLst>
-            <p:seq concurrent="1" nextAc="seek">
-              <p:cTn id="2" dur="indefinite" nodeType="mainSeq">
-                <p:childTnLst>
-                  <p:par>
-                    <p:cTn id="3" fill="hold">
-                      <p:stCondLst>
-                        <p:cond delay="indefinite"/>
-                      </p:stCondLst>
-                      <p:childTnLst>
-                        <p:par>
-                          <p:cTn id="4" fill="hold">
-                            <p:stCondLst>
-                              <p:cond delay="0"/>
-                            </p:stCondLst>
-                            <p:childTnLst>
-                              <p:par>
-                                <p:cTn id="5" presetID="1" presetClass="entr" presetSubtype="0" fill="hold" grpId="0" nodeType="clickEffect">
-                                  <p:stCondLst>
-                                    <p:cond delay="0"/>
-                                  </p:stCondLst>
-                                  <p:childTnLst>
-                                    <p:set>
-                                      <p:cBhvr>
-                                        <p:cTn id="6" dur="1" fill="hold">
-                                          <p:stCondLst>
-                                            <p:cond delay="0"/>
-                                          </p:stCondLst>
-                                        </p:cTn>
-                                        <p:tgtEl>
-                                          <p:spTgt spid="7"/>
-                                        </p:tgtEl>
-                                        <p:attrNameLst>
-                                          <p:attrName>style.visibility</p:attrName>
-                                        </p:attrNameLst>
-                                      </p:cBhvr>
-                                      <p:to>
-                                        <p:strVal val="visible"/>
-                                      </p:to>
-                                    </p:set>
-                                  </p:childTnLst>
-                                </p:cTn>
-                              </p:par>
-                              <p:par>
-                                <p:cTn id="7" presetID="1" presetClass="entr" presetSubtype="0" fill="hold" grpId="0" nodeType="withEffect">
-                                  <p:stCondLst>
-                                    <p:cond delay="0"/>
-                                  </p:stCondLst>
-                                  <p:childTnLst>
-                                    <p:set>
-                                      <p:cBhvr>
-                                        <p:cTn id="8" dur="1" fill="hold">
-                                          <p:stCondLst>
-                                            <p:cond delay="0"/>
-                                          </p:stCondLst>
-                                        </p:cTn>
-                                        <p:tgtEl>
-                                          <p:spTgt spid="8"/>
-                                        </p:tgtEl>
-                                        <p:attrNameLst>
-                                          <p:attrName>style.visibility</p:attrName>
-                                        </p:attrNameLst>
-                                      </p:cBhvr>
-                                      <p:to>
-                                        <p:strVal val="visible"/>
-                                      </p:to>
-                                    </p:set>
-                                  </p:childTnLst>
-                                </p:cTn>
-                              </p:par>
-                            </p:childTnLst>
-                          </p:cTn>
-                        </p:par>
-                      </p:childTnLst>
-                    </p:cTn>
-                  </p:par>
-                </p:childTnLst>
-              </p:cTn>
-              <p:prevCondLst>
-                <p:cond evt="onPrev" delay="0">
-                  <p:tgtEl>
-                    <p:sldTgt/>
-                  </p:tgtEl>
-                </p:cond>
-              </p:prevCondLst>
-              <p:nextCondLst>
-                <p:cond evt="onNext" delay="0">
-                  <p:tgtEl>
-                    <p:sldTgt/>
-                  </p:tgtEl>
-                </p:cond>
-              </p:nextCondLst>
-            </p:seq>
-          </p:childTnLst>
-        </p:cTn>
+        <p:cTn xmlns:p14="http://schemas.microsoft.com/office/powerpoint/2010/main" id="1" dur="indefinite" restart="never" nodeType="tmRoot"/>
       </p:par>
     </p:tnLst>
-    <p:bldLst>
-      <p:bldP spid="7" grpId="0" animBg="1"/>
-      <p:bldP spid="8" grpId="0" animBg="1"/>
-    </p:bldLst>
   </p:timing>
 </p:sld>
 </file>
@@ -8310,8 +8474,31 @@
                 <a:latin typeface="Arial"/>
                 <a:cs typeface="Arial"/>
               </a:rPr>
-              <a:t>–	Feature pruning</a:t>
-            </a:r>
+              <a:t>–	Feature </a:t>
+            </a:r>
+            <a:r>
+              <a:rPr lang="en-US" sz="2400" dirty="0" smtClean="0">
+                <a:solidFill>
+                  <a:schemeClr val="tx1">
+                    <a:lumMod val="75000"/>
+                    <a:lumOff val="25000"/>
+                  </a:schemeClr>
+                </a:solidFill>
+                <a:latin typeface="Arial"/>
+                <a:cs typeface="Arial"/>
+              </a:rPr>
+              <a:t>pruning</a:t>
+            </a:r>
+            <a:endParaRPr lang="en-US" sz="2400" dirty="0" smtClean="0">
+              <a:solidFill>
+                <a:schemeClr val="tx1">
+                  <a:lumMod val="75000"/>
+                  <a:lumOff val="25000"/>
+                </a:schemeClr>
+              </a:solidFill>
+              <a:latin typeface="Arial"/>
+              <a:cs typeface="Arial"/>
+            </a:endParaRPr>
           </a:p>
           <a:p>
             <a:r>

</xml_diff>